<commit_message>
Move a slide to rec
</commit_message>
<xml_diff>
--- a/10-test/lec.pptx
+++ b/10-test/lec.pptx
@@ -5,7 +5,7 @@
     <p:sldMasterId id="2147483648" r:id="rId1"/>
   </p:sldMasterIdLst>
   <p:notesMasterIdLst>
-    <p:notesMasterId r:id="rId36"/>
+    <p:notesMasterId r:id="rId34"/>
   </p:notesMasterIdLst>
   <p:sldIdLst>
     <p:sldId id="441" r:id="rId2"/>
@@ -40,8 +40,6 @@
     <p:sldId id="486" r:id="rId31"/>
     <p:sldId id="540" r:id="rId32"/>
     <p:sldId id="336" r:id="rId33"/>
-    <p:sldId id="546" r:id="rId34"/>
-    <p:sldId id="467" r:id="rId35"/>
   </p:sldIdLst>
   <p:sldSz cx="9144000" cy="6858000" type="screen4x3"/>
   <p:notesSz cx="6858000" cy="9144000"/>
@@ -12403,547 +12401,6 @@
   <p:clrMapOvr>
     <a:masterClrMapping/>
   </p:clrMapOvr>
-</p:sld>
-</file>
-
-<file path=ppt/slides/slide33.xml><?xml version="1.0" encoding="utf-8"?>
-<p:sld xmlns:a="http://schemas.openxmlformats.org/drawingml/2006/main" xmlns:r="http://schemas.openxmlformats.org/officeDocument/2006/relationships" xmlns:p="http://schemas.openxmlformats.org/presentationml/2006/main">
-  <p:cSld>
-    <p:spTree>
-      <p:nvGrpSpPr>
-        <p:cNvPr id="1" name=""/>
-        <p:cNvGrpSpPr/>
-        <p:nvPr/>
-      </p:nvGrpSpPr>
-      <p:grpSpPr>
-        <a:xfrm>
-          <a:off x="0" y="0"/>
-          <a:ext cx="0" cy="0"/>
-          <a:chOff x="0" y="0"/>
-          <a:chExt cx="0" cy="0"/>
-        </a:xfrm>
-      </p:grpSpPr>
-      <p:sp>
-        <p:nvSpPr>
-          <p:cNvPr id="2" name="Title 1">
-            <a:extLst>
-              <a:ext uri="{FF2B5EF4-FFF2-40B4-BE49-F238E27FC236}">
-                <a16:creationId xmlns:a16="http://schemas.microsoft.com/office/drawing/2014/main" id="{6BA39CEB-0959-254E-85BB-8EC160A65037}"/>
-              </a:ext>
-            </a:extLst>
-          </p:cNvPr>
-          <p:cNvSpPr>
-            <a:spLocks noGrp="1"/>
-          </p:cNvSpPr>
-          <p:nvPr>
-            <p:ph type="title"/>
-          </p:nvPr>
-        </p:nvSpPr>
-        <p:spPr/>
-        <p:txBody>
-          <a:bodyPr/>
-          <a:lstStyle/>
-          <a:p>
-            <a:r>
-              <a:rPr lang="en-US" dirty="0"/>
-              <a:t>Move to recitation</a:t>
-            </a:r>
-          </a:p>
-        </p:txBody>
-      </p:sp>
-      <p:sp>
-        <p:nvSpPr>
-          <p:cNvPr id="3" name="Content Placeholder 2">
-            <a:extLst>
-              <a:ext uri="{FF2B5EF4-FFF2-40B4-BE49-F238E27FC236}">
-                <a16:creationId xmlns:a16="http://schemas.microsoft.com/office/drawing/2014/main" id="{E9CB1D24-5AE1-FA48-8D10-5F318B0D8127}"/>
-              </a:ext>
-            </a:extLst>
-          </p:cNvPr>
-          <p:cNvSpPr>
-            <a:spLocks noGrp="1"/>
-          </p:cNvSpPr>
-          <p:nvPr>
-            <p:ph idx="1"/>
-          </p:nvPr>
-        </p:nvSpPr>
-        <p:spPr/>
-        <p:txBody>
-          <a:bodyPr/>
-          <a:lstStyle/>
-          <a:p>
-            <a:endParaRPr lang="en-US"/>
-          </a:p>
-        </p:txBody>
-      </p:sp>
-    </p:spTree>
-    <p:extLst>
-      <p:ext uri="{BB962C8B-B14F-4D97-AF65-F5344CB8AC3E}">
-        <p14:creationId xmlns:p14="http://schemas.microsoft.com/office/powerpoint/2010/main" val="2864043759"/>
-      </p:ext>
-    </p:extLst>
-  </p:cSld>
-  <p:clrMapOvr>
-    <a:masterClrMapping/>
-  </p:clrMapOvr>
-</p:sld>
-</file>
-
-<file path=ppt/slides/slide34.xml><?xml version="1.0" encoding="utf-8"?>
-<p:sld xmlns:a="http://schemas.openxmlformats.org/drawingml/2006/main" xmlns:r="http://schemas.openxmlformats.org/officeDocument/2006/relationships" xmlns:p="http://schemas.openxmlformats.org/presentationml/2006/main">
-  <p:cSld>
-    <p:spTree>
-      <p:nvGrpSpPr>
-        <p:cNvPr id="1" name=""/>
-        <p:cNvGrpSpPr/>
-        <p:nvPr/>
-      </p:nvGrpSpPr>
-      <p:grpSpPr>
-        <a:xfrm>
-          <a:off x="0" y="0"/>
-          <a:ext cx="0" cy="0"/>
-          <a:chOff x="0" y="0"/>
-          <a:chExt cx="0" cy="0"/>
-        </a:xfrm>
-      </p:grpSpPr>
-      <p:sp>
-        <p:nvSpPr>
-          <p:cNvPr id="2" name="Title 1"/>
-          <p:cNvSpPr>
-            <a:spLocks noGrp="1"/>
-          </p:cNvSpPr>
-          <p:nvPr>
-            <p:ph type="title"/>
-          </p:nvPr>
-        </p:nvSpPr>
-        <p:spPr/>
-        <p:txBody>
-          <a:bodyPr/>
-          <a:lstStyle/>
-          <a:p>
-            <a:r>
-              <a:rPr lang="en-US" dirty="0"/>
-              <a:t>Testing data abstractions</a:t>
-            </a:r>
-          </a:p>
-        </p:txBody>
-      </p:sp>
-      <p:sp>
-        <p:nvSpPr>
-          <p:cNvPr id="3" name="Content Placeholder 2"/>
-          <p:cNvSpPr>
-            <a:spLocks noGrp="1"/>
-          </p:cNvSpPr>
-          <p:nvPr>
-            <p:ph idx="1"/>
-          </p:nvPr>
-        </p:nvSpPr>
-        <p:spPr/>
-        <p:txBody>
-          <a:bodyPr>
-            <a:normAutofit fontScale="85000" lnSpcReduction="20000"/>
-          </a:bodyPr>
-          <a:lstStyle/>
-          <a:p>
-            <a:r>
-              <a:rPr lang="en-US" dirty="0"/>
-              <a:t>For every value returned by abstraction, check the RI</a:t>
-            </a:r>
-          </a:p>
-          <a:p>
-            <a:r>
-              <a:rPr lang="en-US" dirty="0"/>
-              <a:t>Some functions of a data abstraction </a:t>
-            </a:r>
-            <a:r>
-              <a:rPr lang="en-US" i="1" dirty="0"/>
-              <a:t>produce</a:t>
-            </a:r>
-            <a:r>
-              <a:rPr lang="en-US" dirty="0"/>
-              <a:t> a value of it</a:t>
-            </a:r>
-          </a:p>
-          <a:p>
-            <a:pPr lvl="1"/>
-            <a:r>
-              <a:rPr lang="en-US" b="1" dirty="0">
-                <a:latin typeface="Courier"/>
-                <a:cs typeface="Courier"/>
-              </a:rPr>
-              <a:t>empty</a:t>
-            </a:r>
-            <a:r>
-              <a:rPr lang="en-US" dirty="0"/>
-              <a:t> produces an empty set</a:t>
-            </a:r>
-          </a:p>
-          <a:p>
-            <a:pPr lvl="1"/>
-            <a:r>
-              <a:rPr lang="en-US" b="1" dirty="0">
-                <a:latin typeface="Courier"/>
-                <a:cs typeface="Courier"/>
-              </a:rPr>
-              <a:t>union</a:t>
-            </a:r>
-            <a:r>
-              <a:rPr lang="en-US" dirty="0"/>
-              <a:t> produces a set</a:t>
-            </a:r>
-          </a:p>
-          <a:p>
-            <a:r>
-              <a:rPr lang="en-US" dirty="0"/>
-              <a:t>Other functions </a:t>
-            </a:r>
-            <a:r>
-              <a:rPr lang="en-US" i="1" dirty="0"/>
-              <a:t>consume </a:t>
-            </a:r>
-            <a:r>
-              <a:rPr lang="en-US" dirty="0"/>
-              <a:t>a value</a:t>
-            </a:r>
-          </a:p>
-          <a:p>
-            <a:pPr lvl="1"/>
-            <a:r>
-              <a:rPr lang="en-US" b="1" dirty="0">
-                <a:latin typeface="Courier"/>
-                <a:cs typeface="Courier"/>
-              </a:rPr>
-              <a:t>size</a:t>
-            </a:r>
-            <a:r>
-              <a:rPr lang="en-US" dirty="0"/>
-              <a:t> consumes a dictionary and produces an integer</a:t>
-            </a:r>
-          </a:p>
-          <a:p>
-            <a:pPr lvl="1"/>
-            <a:r>
-              <a:rPr lang="en-US" b="1" dirty="0">
-                <a:latin typeface="Courier"/>
-                <a:cs typeface="Courier"/>
-              </a:rPr>
-              <a:t>bindings</a:t>
-            </a:r>
-            <a:r>
-              <a:rPr lang="en-US" dirty="0"/>
-              <a:t> consumes a dictionary and produces a list</a:t>
-            </a:r>
-          </a:p>
-          <a:p>
-            <a:r>
-              <a:rPr lang="en-US" dirty="0"/>
-              <a:t>For every possible path through spec and </a:t>
-            </a:r>
-            <a:r>
-              <a:rPr lang="en-US" dirty="0" err="1"/>
-              <a:t>impl</a:t>
-            </a:r>
-            <a:r>
-              <a:rPr lang="en-US" dirty="0"/>
-              <a:t> of producers...  test how a consumer handles it</a:t>
-            </a:r>
-          </a:p>
-          <a:p>
-            <a:pPr lvl="1"/>
-            <a:r>
-              <a:rPr lang="en-US" dirty="0"/>
-              <a:t>e.g. if producers of a set handle sets of size 0, 1, and &gt;1 differently...</a:t>
-            </a:r>
-          </a:p>
-          <a:p>
-            <a:pPr lvl="1"/>
-            <a:r>
-              <a:rPr lang="en-US" dirty="0"/>
-              <a:t>then test each such set with every consumer</a:t>
-            </a:r>
-          </a:p>
-        </p:txBody>
-      </p:sp>
-    </p:spTree>
-    <p:extLst>
-      <p:ext uri="{BB962C8B-B14F-4D97-AF65-F5344CB8AC3E}">
-        <p14:creationId xmlns:p14="http://schemas.microsoft.com/office/powerpoint/2010/main" val="1782415335"/>
-      </p:ext>
-    </p:extLst>
-  </p:cSld>
-  <p:clrMapOvr>
-    <a:masterClrMapping/>
-  </p:clrMapOvr>
-  <p:timing>
-    <p:tnLst>
-      <p:par>
-        <p:cTn id="1" dur="indefinite" restart="never" nodeType="tmRoot">
-          <p:childTnLst>
-            <p:seq concurrent="1" nextAc="seek">
-              <p:cTn id="2" dur="indefinite" nodeType="mainSeq">
-                <p:childTnLst>
-                  <p:par>
-                    <p:cTn id="3" fill="hold">
-                      <p:stCondLst>
-                        <p:cond delay="indefinite"/>
-                      </p:stCondLst>
-                      <p:childTnLst>
-                        <p:par>
-                          <p:cTn id="4" fill="hold">
-                            <p:stCondLst>
-                              <p:cond delay="0"/>
-                            </p:stCondLst>
-                            <p:childTnLst>
-                              <p:par>
-                                <p:cTn id="5" presetID="1" presetClass="entr" presetSubtype="0" fill="hold" nodeType="clickEffect">
-                                  <p:stCondLst>
-                                    <p:cond delay="0"/>
-                                  </p:stCondLst>
-                                  <p:childTnLst>
-                                    <p:set>
-                                      <p:cBhvr>
-                                        <p:cTn id="6" dur="1" fill="hold">
-                                          <p:stCondLst>
-                                            <p:cond delay="0"/>
-                                          </p:stCondLst>
-                                        </p:cTn>
-                                        <p:tgtEl>
-                                          <p:spTgt spid="3">
-                                            <p:txEl>
-                                              <p:pRg st="4" end="4"/>
-                                            </p:txEl>
-                                          </p:spTgt>
-                                        </p:tgtEl>
-                                        <p:attrNameLst>
-                                          <p:attrName>style.visibility</p:attrName>
-                                        </p:attrNameLst>
-                                      </p:cBhvr>
-                                      <p:to>
-                                        <p:strVal val="visible"/>
-                                      </p:to>
-                                    </p:set>
-                                  </p:childTnLst>
-                                </p:cTn>
-                              </p:par>
-                              <p:par>
-                                <p:cTn id="7" presetID="1" presetClass="entr" presetSubtype="0" fill="hold" nodeType="withEffect">
-                                  <p:stCondLst>
-                                    <p:cond delay="0"/>
-                                  </p:stCondLst>
-                                  <p:childTnLst>
-                                    <p:set>
-                                      <p:cBhvr>
-                                        <p:cTn id="8" dur="1" fill="hold">
-                                          <p:stCondLst>
-                                            <p:cond delay="0"/>
-                                          </p:stCondLst>
-                                        </p:cTn>
-                                        <p:tgtEl>
-                                          <p:spTgt spid="3">
-                                            <p:txEl>
-                                              <p:pRg st="5" end="5"/>
-                                            </p:txEl>
-                                          </p:spTgt>
-                                        </p:tgtEl>
-                                        <p:attrNameLst>
-                                          <p:attrName>style.visibility</p:attrName>
-                                        </p:attrNameLst>
-                                      </p:cBhvr>
-                                      <p:to>
-                                        <p:strVal val="visible"/>
-                                      </p:to>
-                                    </p:set>
-                                  </p:childTnLst>
-                                </p:cTn>
-                              </p:par>
-                              <p:par>
-                                <p:cTn id="9" presetID="1" presetClass="entr" presetSubtype="0" fill="hold" nodeType="withEffect">
-                                  <p:stCondLst>
-                                    <p:cond delay="0"/>
-                                  </p:stCondLst>
-                                  <p:childTnLst>
-                                    <p:set>
-                                      <p:cBhvr>
-                                        <p:cTn id="10" dur="1" fill="hold">
-                                          <p:stCondLst>
-                                            <p:cond delay="0"/>
-                                          </p:stCondLst>
-                                        </p:cTn>
-                                        <p:tgtEl>
-                                          <p:spTgt spid="3">
-                                            <p:txEl>
-                                              <p:pRg st="6" end="6"/>
-                                            </p:txEl>
-                                          </p:spTgt>
-                                        </p:tgtEl>
-                                        <p:attrNameLst>
-                                          <p:attrName>style.visibility</p:attrName>
-                                        </p:attrNameLst>
-                                      </p:cBhvr>
-                                      <p:to>
-                                        <p:strVal val="visible"/>
-                                      </p:to>
-                                    </p:set>
-                                  </p:childTnLst>
-                                </p:cTn>
-                              </p:par>
-                            </p:childTnLst>
-                          </p:cTn>
-                        </p:par>
-                      </p:childTnLst>
-                    </p:cTn>
-                  </p:par>
-                  <p:par>
-                    <p:cTn id="11" fill="hold">
-                      <p:stCondLst>
-                        <p:cond delay="indefinite"/>
-                      </p:stCondLst>
-                      <p:childTnLst>
-                        <p:par>
-                          <p:cTn id="12" fill="hold">
-                            <p:stCondLst>
-                              <p:cond delay="0"/>
-                            </p:stCondLst>
-                            <p:childTnLst>
-                              <p:par>
-                                <p:cTn id="13" presetID="1" presetClass="entr" presetSubtype="0" fill="hold" nodeType="clickEffect">
-                                  <p:stCondLst>
-                                    <p:cond delay="0"/>
-                                  </p:stCondLst>
-                                  <p:childTnLst>
-                                    <p:set>
-                                      <p:cBhvr>
-                                        <p:cTn id="14" dur="1" fill="hold">
-                                          <p:stCondLst>
-                                            <p:cond delay="0"/>
-                                          </p:stCondLst>
-                                        </p:cTn>
-                                        <p:tgtEl>
-                                          <p:spTgt spid="3">
-                                            <p:txEl>
-                                              <p:pRg st="7" end="7"/>
-                                            </p:txEl>
-                                          </p:spTgt>
-                                        </p:tgtEl>
-                                        <p:attrNameLst>
-                                          <p:attrName>style.visibility</p:attrName>
-                                        </p:attrNameLst>
-                                      </p:cBhvr>
-                                      <p:to>
-                                        <p:strVal val="visible"/>
-                                      </p:to>
-                                    </p:set>
-                                  </p:childTnLst>
-                                </p:cTn>
-                              </p:par>
-                            </p:childTnLst>
-                          </p:cTn>
-                        </p:par>
-                      </p:childTnLst>
-                    </p:cTn>
-                  </p:par>
-                  <p:par>
-                    <p:cTn id="15" fill="hold">
-                      <p:stCondLst>
-                        <p:cond delay="indefinite"/>
-                      </p:stCondLst>
-                      <p:childTnLst>
-                        <p:par>
-                          <p:cTn id="16" fill="hold">
-                            <p:stCondLst>
-                              <p:cond delay="0"/>
-                            </p:stCondLst>
-                            <p:childTnLst>
-                              <p:par>
-                                <p:cTn id="17" presetID="1" presetClass="entr" presetSubtype="0" fill="hold" nodeType="clickEffect">
-                                  <p:stCondLst>
-                                    <p:cond delay="0"/>
-                                  </p:stCondLst>
-                                  <p:childTnLst>
-                                    <p:set>
-                                      <p:cBhvr>
-                                        <p:cTn id="18" dur="1" fill="hold">
-                                          <p:stCondLst>
-                                            <p:cond delay="0"/>
-                                          </p:stCondLst>
-                                        </p:cTn>
-                                        <p:tgtEl>
-                                          <p:spTgt spid="3">
-                                            <p:txEl>
-                                              <p:pRg st="8" end="8"/>
-                                            </p:txEl>
-                                          </p:spTgt>
-                                        </p:tgtEl>
-                                        <p:attrNameLst>
-                                          <p:attrName>style.visibility</p:attrName>
-                                        </p:attrNameLst>
-                                      </p:cBhvr>
-                                      <p:to>
-                                        <p:strVal val="visible"/>
-                                      </p:to>
-                                    </p:set>
-                                  </p:childTnLst>
-                                </p:cTn>
-                              </p:par>
-                              <p:par>
-                                <p:cTn id="19" presetID="1" presetClass="entr" presetSubtype="0" fill="hold" nodeType="withEffect">
-                                  <p:stCondLst>
-                                    <p:cond delay="0"/>
-                                  </p:stCondLst>
-                                  <p:childTnLst>
-                                    <p:set>
-                                      <p:cBhvr>
-                                        <p:cTn id="20" dur="1" fill="hold">
-                                          <p:stCondLst>
-                                            <p:cond delay="0"/>
-                                          </p:stCondLst>
-                                        </p:cTn>
-                                        <p:tgtEl>
-                                          <p:spTgt spid="3">
-                                            <p:txEl>
-                                              <p:pRg st="9" end="9"/>
-                                            </p:txEl>
-                                          </p:spTgt>
-                                        </p:tgtEl>
-                                        <p:attrNameLst>
-                                          <p:attrName>style.visibility</p:attrName>
-                                        </p:attrNameLst>
-                                      </p:cBhvr>
-                                      <p:to>
-                                        <p:strVal val="visible"/>
-                                      </p:to>
-                                    </p:set>
-                                  </p:childTnLst>
-                                </p:cTn>
-                              </p:par>
-                            </p:childTnLst>
-                          </p:cTn>
-                        </p:par>
-                      </p:childTnLst>
-                    </p:cTn>
-                  </p:par>
-                </p:childTnLst>
-              </p:cTn>
-              <p:prevCondLst>
-                <p:cond evt="onPrev" delay="0">
-                  <p:tgtEl>
-                    <p:sldTgt/>
-                  </p:tgtEl>
-                </p:cond>
-              </p:prevCondLst>
-              <p:nextCondLst>
-                <p:cond evt="onNext" delay="0">
-                  <p:tgtEl>
-                    <p:sldTgt/>
-                  </p:tgtEl>
-                </p:cond>
-              </p:nextCondLst>
-            </p:seq>
-          </p:childTnLst>
-        </p:cTn>
-      </p:par>
-    </p:tnLst>
-  </p:timing>
 </p:sld>
 </file>
 

</xml_diff>

<commit_message>
Add slide on fuzz testing
</commit_message>
<xml_diff>
--- a/10-test/lec.pptx
+++ b/10-test/lec.pptx
@@ -5,7 +5,7 @@
     <p:sldMasterId id="2147483648" r:id="rId1"/>
   </p:sldMasterIdLst>
   <p:notesMasterIdLst>
-    <p:notesMasterId r:id="rId34"/>
+    <p:notesMasterId r:id="rId38"/>
   </p:notesMasterIdLst>
   <p:sldIdLst>
     <p:sldId id="441" r:id="rId2"/>
@@ -27,19 +27,23 @@
     <p:sldId id="539" r:id="rId18"/>
     <p:sldId id="475" r:id="rId19"/>
     <p:sldId id="474" r:id="rId20"/>
-    <p:sldId id="476" r:id="rId21"/>
-    <p:sldId id="478" r:id="rId22"/>
-    <p:sldId id="489" r:id="rId23"/>
-    <p:sldId id="479" r:id="rId24"/>
-    <p:sldId id="480" r:id="rId25"/>
-    <p:sldId id="482" r:id="rId26"/>
-    <p:sldId id="483" r:id="rId27"/>
-    <p:sldId id="466" r:id="rId28"/>
-    <p:sldId id="545" r:id="rId29"/>
-    <p:sldId id="485" r:id="rId30"/>
-    <p:sldId id="486" r:id="rId31"/>
-    <p:sldId id="540" r:id="rId32"/>
-    <p:sldId id="336" r:id="rId33"/>
+    <p:sldId id="546" r:id="rId21"/>
+    <p:sldId id="476" r:id="rId22"/>
+    <p:sldId id="478" r:id="rId23"/>
+    <p:sldId id="489" r:id="rId24"/>
+    <p:sldId id="479" r:id="rId25"/>
+    <p:sldId id="480" r:id="rId26"/>
+    <p:sldId id="482" r:id="rId27"/>
+    <p:sldId id="483" r:id="rId28"/>
+    <p:sldId id="547" r:id="rId29"/>
+    <p:sldId id="466" r:id="rId30"/>
+    <p:sldId id="545" r:id="rId31"/>
+    <p:sldId id="485" r:id="rId32"/>
+    <p:sldId id="486" r:id="rId33"/>
+    <p:sldId id="540" r:id="rId34"/>
+    <p:sldId id="548" r:id="rId35"/>
+    <p:sldId id="487" r:id="rId36"/>
+    <p:sldId id="336" r:id="rId37"/>
   </p:sldIdLst>
   <p:sldSz cx="9144000" cy="6858000" type="screen4x3"/>
   <p:notesSz cx="6858000" cy="9144000"/>
@@ -239,7 +243,7 @@
           <a:p>
             <a:fld id="{5367F125-181F-9A48-A24E-AAD89CB055B5}" type="datetimeFigureOut">
               <a:rPr lang="en-US" smtClean="0"/>
-              <a:t>9/29/19</a:t>
+              <a:t>9/30/19</a:t>
             </a:fld>
             <a:endParaRPr lang="en-US"/>
           </a:p>
@@ -987,7 +991,7 @@
           <a:p>
             <a:fld id="{B7975FD5-AB21-4C45-BFE8-1D3F02B463E2}" type="slidenum">
               <a:rPr lang="en-US" smtClean="0"/>
-              <a:t>28</a:t>
+              <a:t>30</a:t>
             </a:fld>
             <a:endParaRPr lang="en-US"/>
           </a:p>
@@ -1050,6 +1054,14 @@
           <a:bodyPr/>
           <a:lstStyle/>
           <a:p>
+            <a:r>
+              <a:rPr lang="en-US" dirty="0"/>
+              <a:t>Literally was a</a:t>
+            </a:r>
+            <a:r>
+              <a:rPr lang="en-US" baseline="0" dirty="0"/>
+              <a:t> dark and stormy night:  noise on telephone line was inserting random character into shell session, causing Unix utilities to crash</a:t>
+            </a:r>
             <a:endParaRPr lang="en-US" dirty="0"/>
           </a:p>
         </p:txBody>
@@ -1071,7 +1083,91 @@
           <a:p>
             <a:fld id="{B7975FD5-AB21-4C45-BFE8-1D3F02B463E2}" type="slidenum">
               <a:rPr lang="en-US" smtClean="0"/>
-              <a:t>32</a:t>
+              <a:t>35</a:t>
+            </a:fld>
+            <a:endParaRPr lang="en-US"/>
+          </a:p>
+        </p:txBody>
+      </p:sp>
+    </p:spTree>
+    <p:extLst>
+      <p:ext uri="{BB962C8B-B14F-4D97-AF65-F5344CB8AC3E}">
+        <p14:creationId xmlns:p14="http://schemas.microsoft.com/office/powerpoint/2010/main" val="866203678"/>
+      </p:ext>
+    </p:extLst>
+  </p:cSld>
+  <p:clrMapOvr>
+    <a:masterClrMapping/>
+  </p:clrMapOvr>
+</p:notes>
+</file>
+
+<file path=ppt/notesSlides/notesSlide7.xml><?xml version="1.0" encoding="utf-8"?>
+<p:notes xmlns:a="http://schemas.openxmlformats.org/drawingml/2006/main" xmlns:r="http://schemas.openxmlformats.org/officeDocument/2006/relationships" xmlns:p="http://schemas.openxmlformats.org/presentationml/2006/main">
+  <p:cSld>
+    <p:spTree>
+      <p:nvGrpSpPr>
+        <p:cNvPr id="1" name=""/>
+        <p:cNvGrpSpPr/>
+        <p:nvPr/>
+      </p:nvGrpSpPr>
+      <p:grpSpPr>
+        <a:xfrm>
+          <a:off x="0" y="0"/>
+          <a:ext cx="0" cy="0"/>
+          <a:chOff x="0" y="0"/>
+          <a:chExt cx="0" cy="0"/>
+        </a:xfrm>
+      </p:grpSpPr>
+      <p:sp>
+        <p:nvSpPr>
+          <p:cNvPr id="2" name="Slide Image Placeholder 1"/>
+          <p:cNvSpPr>
+            <a:spLocks noGrp="1" noRot="1" noChangeAspect="1"/>
+          </p:cNvSpPr>
+          <p:nvPr>
+            <p:ph type="sldImg"/>
+          </p:nvPr>
+        </p:nvSpPr>
+        <p:spPr/>
+      </p:sp>
+      <p:sp>
+        <p:nvSpPr>
+          <p:cNvPr id="3" name="Notes Placeholder 2"/>
+          <p:cNvSpPr>
+            <a:spLocks noGrp="1"/>
+          </p:cNvSpPr>
+          <p:nvPr>
+            <p:ph type="body" idx="1"/>
+          </p:nvPr>
+        </p:nvSpPr>
+        <p:spPr/>
+        <p:txBody>
+          <a:bodyPr/>
+          <a:lstStyle/>
+          <a:p>
+            <a:endParaRPr lang="en-US" dirty="0"/>
+          </a:p>
+        </p:txBody>
+      </p:sp>
+      <p:sp>
+        <p:nvSpPr>
+          <p:cNvPr id="4" name="Slide Number Placeholder 3"/>
+          <p:cNvSpPr>
+            <a:spLocks noGrp="1"/>
+          </p:cNvSpPr>
+          <p:nvPr>
+            <p:ph type="sldNum" sz="quarter" idx="10"/>
+          </p:nvPr>
+        </p:nvSpPr>
+        <p:spPr/>
+        <p:txBody>
+          <a:bodyPr/>
+          <a:lstStyle/>
+          <a:p>
+            <a:fld id="{B7975FD5-AB21-4C45-BFE8-1D3F02B463E2}" type="slidenum">
+              <a:rPr lang="en-US" smtClean="0"/>
+              <a:t>36</a:t>
             </a:fld>
             <a:endParaRPr lang="en-US"/>
           </a:p>
@@ -1242,7 +1338,7 @@
           <a:p>
             <a:fld id="{96331252-4874-F047-84B8-3D3EF8743E79}" type="datetimeFigureOut">
               <a:rPr lang="en-US" smtClean="0"/>
-              <a:t>9/29/19</a:t>
+              <a:t>9/30/19</a:t>
             </a:fld>
             <a:endParaRPr lang="en-US"/>
           </a:p>
@@ -1509,7 +1605,7 @@
           <a:p>
             <a:fld id="{96331252-4874-F047-84B8-3D3EF8743E79}" type="datetimeFigureOut">
               <a:rPr lang="en-US" smtClean="0"/>
-              <a:t>9/29/19</a:t>
+              <a:t>9/30/19</a:t>
             </a:fld>
             <a:endParaRPr lang="en-US"/>
           </a:p>
@@ -1687,7 +1783,7 @@
           <a:p>
             <a:fld id="{96331252-4874-F047-84B8-3D3EF8743E79}" type="datetimeFigureOut">
               <a:rPr lang="en-US" smtClean="0"/>
-              <a:t>9/29/19</a:t>
+              <a:t>9/30/19</a:t>
             </a:fld>
             <a:endParaRPr lang="en-US"/>
           </a:p>
@@ -1863,7 +1959,7 @@
           <a:p>
             <a:fld id="{96331252-4874-F047-84B8-3D3EF8743E79}" type="datetimeFigureOut">
               <a:rPr lang="en-US" smtClean="0"/>
-              <a:t>9/29/19</a:t>
+              <a:t>9/30/19</a:t>
             </a:fld>
             <a:endParaRPr lang="en-US"/>
           </a:p>
@@ -2112,7 +2208,7 @@
           <a:p>
             <a:fld id="{96331252-4874-F047-84B8-3D3EF8743E79}" type="datetimeFigureOut">
               <a:rPr lang="en-US" smtClean="0"/>
-              <a:t>9/29/19</a:t>
+              <a:t>9/30/19</a:t>
             </a:fld>
             <a:endParaRPr lang="en-US"/>
           </a:p>
@@ -2397,7 +2493,7 @@
           <a:p>
             <a:fld id="{96331252-4874-F047-84B8-3D3EF8743E79}" type="datetimeFigureOut">
               <a:rPr lang="en-US" smtClean="0"/>
-              <a:t>9/29/19</a:t>
+              <a:t>9/30/19</a:t>
             </a:fld>
             <a:endParaRPr lang="en-US"/>
           </a:p>
@@ -2816,7 +2912,7 @@
           <a:p>
             <a:fld id="{96331252-4874-F047-84B8-3D3EF8743E79}" type="datetimeFigureOut">
               <a:rPr lang="en-US" smtClean="0"/>
-              <a:t>9/29/19</a:t>
+              <a:t>9/30/19</a:t>
             </a:fld>
             <a:endParaRPr lang="en-US"/>
           </a:p>
@@ -2933,7 +3029,7 @@
           <a:p>
             <a:fld id="{96331252-4874-F047-84B8-3D3EF8743E79}" type="datetimeFigureOut">
               <a:rPr lang="en-US" smtClean="0"/>
-              <a:t>9/29/19</a:t>
+              <a:t>9/30/19</a:t>
             </a:fld>
             <a:endParaRPr lang="en-US"/>
           </a:p>
@@ -3028,7 +3124,7 @@
           <a:p>
             <a:fld id="{96331252-4874-F047-84B8-3D3EF8743E79}" type="datetimeFigureOut">
               <a:rPr lang="en-US" smtClean="0"/>
-              <a:t>9/29/19</a:t>
+              <a:t>9/30/19</a:t>
             </a:fld>
             <a:endParaRPr lang="en-US"/>
           </a:p>
@@ -3303,7 +3399,7 @@
           <a:p>
             <a:fld id="{96331252-4874-F047-84B8-3D3EF8743E79}" type="datetimeFigureOut">
               <a:rPr lang="en-US" smtClean="0"/>
-              <a:t>9/29/19</a:t>
+              <a:t>9/30/19</a:t>
             </a:fld>
             <a:endParaRPr lang="en-US"/>
           </a:p>
@@ -3555,7 +3651,7 @@
           <a:p>
             <a:fld id="{96331252-4874-F047-84B8-3D3EF8743E79}" type="datetimeFigureOut">
               <a:rPr lang="en-US" smtClean="0"/>
-              <a:t>9/29/19</a:t>
+              <a:t>9/30/19</a:t>
             </a:fld>
             <a:endParaRPr lang="en-US"/>
           </a:p>
@@ -3769,7 +3865,7 @@
             <a:fld id="{96331252-4874-F047-84B8-3D3EF8743E79}" type="datetimeFigureOut">
               <a:rPr lang="en-US" smtClean="0"/>
               <a:pPr/>
-              <a:t>9/29/19</a:t>
+              <a:t>9/30/19</a:t>
             </a:fld>
             <a:endParaRPr lang="en-US"/>
           </a:p>
@@ -6447,6 +6543,77 @@
 </file>
 
 <file path=ppt/slides/slide20.xml><?xml version="1.0" encoding="utf-8"?>
+<p:sld xmlns:a="http://schemas.openxmlformats.org/drawingml/2006/main" xmlns:r="http://schemas.openxmlformats.org/officeDocument/2006/relationships" xmlns:p="http://schemas.openxmlformats.org/presentationml/2006/main">
+  <p:cSld>
+    <p:spTree>
+      <p:nvGrpSpPr>
+        <p:cNvPr id="1" name=""/>
+        <p:cNvGrpSpPr/>
+        <p:nvPr/>
+      </p:nvGrpSpPr>
+      <p:grpSpPr>
+        <a:xfrm>
+          <a:off x="0" y="0"/>
+          <a:ext cx="0" cy="0"/>
+          <a:chOff x="0" y="0"/>
+          <a:chExt cx="0" cy="0"/>
+        </a:xfrm>
+      </p:grpSpPr>
+      <p:sp>
+        <p:nvSpPr>
+          <p:cNvPr id="4" name="Title 3"/>
+          <p:cNvSpPr>
+            <a:spLocks noGrp="1"/>
+          </p:cNvSpPr>
+          <p:nvPr>
+            <p:ph type="title"/>
+          </p:nvPr>
+        </p:nvSpPr>
+        <p:spPr/>
+        <p:txBody>
+          <a:bodyPr/>
+          <a:lstStyle/>
+          <a:p>
+            <a:r>
+              <a:rPr lang="en-US" dirty="0"/>
+              <a:t>Black box Testing</a:t>
+            </a:r>
+          </a:p>
+        </p:txBody>
+      </p:sp>
+      <p:sp>
+        <p:nvSpPr>
+          <p:cNvPr id="5" name="Text Placeholder 4"/>
+          <p:cNvSpPr>
+            <a:spLocks noGrp="1"/>
+          </p:cNvSpPr>
+          <p:nvPr>
+            <p:ph type="body" idx="1"/>
+          </p:nvPr>
+        </p:nvSpPr>
+        <p:spPr/>
+        <p:txBody>
+          <a:bodyPr/>
+          <a:lstStyle/>
+          <a:p>
+            <a:endParaRPr lang="en-US"/>
+          </a:p>
+        </p:txBody>
+      </p:sp>
+    </p:spTree>
+    <p:extLst>
+      <p:ext uri="{BB962C8B-B14F-4D97-AF65-F5344CB8AC3E}">
+        <p14:creationId xmlns:p14="http://schemas.microsoft.com/office/powerpoint/2010/main" val="3231706333"/>
+      </p:ext>
+    </p:extLst>
+  </p:cSld>
+  <p:clrMapOvr>
+    <a:masterClrMapping/>
+  </p:clrMapOvr>
+</p:sld>
+</file>
+
+<file path=ppt/slides/slide21.xml><?xml version="1.0" encoding="utf-8"?>
 <p:sld xmlns:a="http://schemas.openxmlformats.org/drawingml/2006/main" xmlns:r="http://schemas.openxmlformats.org/officeDocument/2006/relationships" xmlns:p="http://schemas.openxmlformats.org/presentationml/2006/main">
   <p:cSld>
     <p:spTree>
@@ -6962,7 +7129,7 @@
 </p:sld>
 </file>
 
-<file path=ppt/slides/slide21.xml><?xml version="1.0" encoding="utf-8"?>
+<file path=ppt/slides/slide22.xml><?xml version="1.0" encoding="utf-8"?>
 <p:sld xmlns:a="http://schemas.openxmlformats.org/drawingml/2006/main" xmlns:r="http://schemas.openxmlformats.org/officeDocument/2006/relationships" xmlns:p="http://schemas.openxmlformats.org/presentationml/2006/main">
   <p:cSld>
     <p:spTree>
@@ -7451,7 +7618,7 @@
 </p:sld>
 </file>
 
-<file path=ppt/slides/slide22.xml><?xml version="1.0" encoding="utf-8"?>
+<file path=ppt/slides/slide23.xml><?xml version="1.0" encoding="utf-8"?>
 <p:sld xmlns:a="http://schemas.openxmlformats.org/drawingml/2006/main" xmlns:r="http://schemas.openxmlformats.org/officeDocument/2006/relationships" xmlns:p="http://schemas.openxmlformats.org/presentationml/2006/main">
   <p:cSld>
     <p:spTree>
@@ -7533,7 +7700,7 @@
 </p:sld>
 </file>
 
-<file path=ppt/slides/slide23.xml><?xml version="1.0" encoding="utf-8"?>
+<file path=ppt/slides/slide24.xml><?xml version="1.0" encoding="utf-8"?>
 <p:sld xmlns:a="http://schemas.openxmlformats.org/drawingml/2006/main" xmlns:r="http://schemas.openxmlformats.org/officeDocument/2006/relationships" xmlns:p="http://schemas.openxmlformats.org/presentationml/2006/main">
   <p:cSld>
     <p:spTree>
@@ -8201,7 +8368,7 @@
 </p:sld>
 </file>
 
-<file path=ppt/slides/slide24.xml><?xml version="1.0" encoding="utf-8"?>
+<file path=ppt/slides/slide25.xml><?xml version="1.0" encoding="utf-8"?>
 <p:sld xmlns:a="http://schemas.openxmlformats.org/drawingml/2006/main" xmlns:r="http://schemas.openxmlformats.org/officeDocument/2006/relationships" xmlns:p="http://schemas.openxmlformats.org/presentationml/2006/main">
   <p:cSld>
     <p:spTree>
@@ -8853,7 +9020,7 @@
 </p:sld>
 </file>
 
-<file path=ppt/slides/slide25.xml><?xml version="1.0" encoding="utf-8"?>
+<file path=ppt/slides/slide26.xml><?xml version="1.0" encoding="utf-8"?>
 <p:sld xmlns:a="http://schemas.openxmlformats.org/drawingml/2006/main" xmlns:r="http://schemas.openxmlformats.org/officeDocument/2006/relationships" xmlns:p="http://schemas.openxmlformats.org/presentationml/2006/main">
   <p:cSld>
     <p:spTree>
@@ -9458,7 +9625,7 @@
 </p:sld>
 </file>
 
-<file path=ppt/slides/slide26.xml><?xml version="1.0" encoding="utf-8"?>
+<file path=ppt/slides/slide27.xml><?xml version="1.0" encoding="utf-8"?>
 <p:sld xmlns:a="http://schemas.openxmlformats.org/drawingml/2006/main" xmlns:r="http://schemas.openxmlformats.org/officeDocument/2006/relationships" xmlns:p="http://schemas.openxmlformats.org/presentationml/2006/main">
   <p:cSld>
     <p:spTree>
@@ -10063,7 +10230,78 @@
 </p:sld>
 </file>
 
-<file path=ppt/slides/slide27.xml><?xml version="1.0" encoding="utf-8"?>
+<file path=ppt/slides/slide28.xml><?xml version="1.0" encoding="utf-8"?>
+<p:sld xmlns:a="http://schemas.openxmlformats.org/drawingml/2006/main" xmlns:r="http://schemas.openxmlformats.org/officeDocument/2006/relationships" xmlns:p="http://schemas.openxmlformats.org/presentationml/2006/main">
+  <p:cSld>
+    <p:spTree>
+      <p:nvGrpSpPr>
+        <p:cNvPr id="1" name=""/>
+        <p:cNvGrpSpPr/>
+        <p:nvPr/>
+      </p:nvGrpSpPr>
+      <p:grpSpPr>
+        <a:xfrm>
+          <a:off x="0" y="0"/>
+          <a:ext cx="0" cy="0"/>
+          <a:chOff x="0" y="0"/>
+          <a:chExt cx="0" cy="0"/>
+        </a:xfrm>
+      </p:grpSpPr>
+      <p:sp>
+        <p:nvSpPr>
+          <p:cNvPr id="4" name="Title 3"/>
+          <p:cNvSpPr>
+            <a:spLocks noGrp="1"/>
+          </p:cNvSpPr>
+          <p:nvPr>
+            <p:ph type="title"/>
+          </p:nvPr>
+        </p:nvSpPr>
+        <p:spPr/>
+        <p:txBody>
+          <a:bodyPr/>
+          <a:lstStyle/>
+          <a:p>
+            <a:r>
+              <a:rPr lang="en-US" dirty="0"/>
+              <a:t>Glass box Testing</a:t>
+            </a:r>
+          </a:p>
+        </p:txBody>
+      </p:sp>
+      <p:sp>
+        <p:nvSpPr>
+          <p:cNvPr id="5" name="Text Placeholder 4"/>
+          <p:cNvSpPr>
+            <a:spLocks noGrp="1"/>
+          </p:cNvSpPr>
+          <p:nvPr>
+            <p:ph type="body" idx="1"/>
+          </p:nvPr>
+        </p:nvSpPr>
+        <p:spPr/>
+        <p:txBody>
+          <a:bodyPr/>
+          <a:lstStyle/>
+          <a:p>
+            <a:endParaRPr lang="en-US"/>
+          </a:p>
+        </p:txBody>
+      </p:sp>
+    </p:spTree>
+    <p:extLst>
+      <p:ext uri="{BB962C8B-B14F-4D97-AF65-F5344CB8AC3E}">
+        <p14:creationId xmlns:p14="http://schemas.microsoft.com/office/powerpoint/2010/main" val="91270920"/>
+      </p:ext>
+    </p:extLst>
+  </p:cSld>
+  <p:clrMapOvr>
+    <a:masterClrMapping/>
+  </p:clrMapOvr>
+</p:sld>
+</file>
+
+<file path=ppt/slides/slide29.xml><?xml version="1.0" encoding="utf-8"?>
 <p:sld xmlns:a="http://schemas.openxmlformats.org/drawingml/2006/main" xmlns:r="http://schemas.openxmlformats.org/officeDocument/2006/relationships" xmlns:p="http://schemas.openxmlformats.org/presentationml/2006/main">
   <p:cSld>
     <p:spTree>
@@ -10390,7 +10628,136 @@
 </p:sld>
 </file>
 
-<file path=ppt/slides/slide28.xml><?xml version="1.0" encoding="utf-8"?>
+<file path=ppt/slides/slide3.xml><?xml version="1.0" encoding="utf-8"?>
+<p:sld xmlns:a="http://schemas.openxmlformats.org/drawingml/2006/main" xmlns:r="http://schemas.openxmlformats.org/officeDocument/2006/relationships" xmlns:p="http://schemas.openxmlformats.org/presentationml/2006/main">
+  <p:cSld>
+    <p:spTree>
+      <p:nvGrpSpPr>
+        <p:cNvPr id="1" name=""/>
+        <p:cNvGrpSpPr/>
+        <p:nvPr/>
+      </p:nvGrpSpPr>
+      <p:grpSpPr>
+        <a:xfrm>
+          <a:off x="0" y="0"/>
+          <a:ext cx="0" cy="0"/>
+          <a:chOff x="0" y="0"/>
+          <a:chExt cx="0" cy="0"/>
+        </a:xfrm>
+      </p:grpSpPr>
+      <p:sp>
+        <p:nvSpPr>
+          <p:cNvPr id="2" name="Title 1"/>
+          <p:cNvSpPr>
+            <a:spLocks noGrp="1"/>
+          </p:cNvSpPr>
+          <p:nvPr>
+            <p:ph type="title"/>
+          </p:nvPr>
+        </p:nvSpPr>
+        <p:spPr/>
+        <p:txBody>
+          <a:bodyPr/>
+          <a:lstStyle/>
+          <a:p>
+            <a:r>
+              <a:rPr lang="en-US" dirty="0"/>
+              <a:t>Review</a:t>
+            </a:r>
+          </a:p>
+        </p:txBody>
+      </p:sp>
+      <p:sp>
+        <p:nvSpPr>
+          <p:cNvPr id="3" name="Content Placeholder 2"/>
+          <p:cNvSpPr>
+            <a:spLocks noGrp="1"/>
+          </p:cNvSpPr>
+          <p:nvPr>
+            <p:ph idx="1"/>
+          </p:nvPr>
+        </p:nvSpPr>
+        <p:spPr/>
+        <p:txBody>
+          <a:bodyPr>
+            <a:normAutofit fontScale="92500" lnSpcReduction="10000"/>
+          </a:bodyPr>
+          <a:lstStyle/>
+          <a:p>
+            <a:pPr marL="0" indent="0">
+              <a:buNone/>
+            </a:pPr>
+            <a:r>
+              <a:rPr lang="en-US" b="1" dirty="0"/>
+              <a:t>Previously in 3110:</a:t>
+            </a:r>
+          </a:p>
+          <a:p>
+            <a:r>
+              <a:rPr lang="en-US" dirty="0"/>
+              <a:t>Modules</a:t>
+            </a:r>
+          </a:p>
+          <a:p>
+            <a:r>
+              <a:rPr lang="en-US" dirty="0"/>
+              <a:t>Specification (functions, modules)</a:t>
+            </a:r>
+          </a:p>
+          <a:p>
+            <a:endParaRPr lang="en-US" dirty="0"/>
+          </a:p>
+          <a:p>
+            <a:pPr marL="0" indent="0">
+              <a:buNone/>
+            </a:pPr>
+            <a:r>
+              <a:rPr lang="en-US" b="1" dirty="0"/>
+              <a:t>Today:</a:t>
+            </a:r>
+          </a:p>
+          <a:p>
+            <a:r>
+              <a:rPr lang="en-US" dirty="0"/>
+              <a:t>Validation</a:t>
+            </a:r>
+          </a:p>
+          <a:p>
+            <a:r>
+              <a:rPr lang="en-US" dirty="0"/>
+              <a:t>Testing </a:t>
+            </a:r>
+          </a:p>
+          <a:p>
+            <a:pPr lvl="1"/>
+            <a:r>
+              <a:rPr lang="en-US" dirty="0"/>
+              <a:t>Black box</a:t>
+            </a:r>
+          </a:p>
+          <a:p>
+            <a:pPr lvl="1"/>
+            <a:r>
+              <a:rPr lang="en-US" dirty="0"/>
+              <a:t>Glass box</a:t>
+            </a:r>
+          </a:p>
+        </p:txBody>
+      </p:sp>
+    </p:spTree>
+    <p:extLst>
+      <p:ext uri="{BB962C8B-B14F-4D97-AF65-F5344CB8AC3E}">
+        <p14:creationId xmlns:p14="http://schemas.microsoft.com/office/powerpoint/2010/main" val="1939838692"/>
+      </p:ext>
+    </p:extLst>
+  </p:cSld>
+  <p:clrMapOvr>
+    <a:masterClrMapping/>
+  </p:clrMapOvr>
+</p:sld>
+</file>
+
+<file path=ppt/slides/slide30.xml><?xml version="1.0" encoding="utf-8"?>
 <p:sld xmlns:a="http://schemas.openxmlformats.org/drawingml/2006/main" xmlns:r="http://schemas.openxmlformats.org/officeDocument/2006/relationships" xmlns:p="http://schemas.openxmlformats.org/presentationml/2006/main">
   <p:cSld>
     <p:spTree>
@@ -10907,7 +11274,7 @@
 </p:sld>
 </file>
 
-<file path=ppt/slides/slide29.xml><?xml version="1.0" encoding="utf-8"?>
+<file path=ppt/slides/slide31.xml><?xml version="1.0" encoding="utf-8"?>
 <p:sld xmlns:a="http://schemas.openxmlformats.org/drawingml/2006/main" xmlns:r="http://schemas.openxmlformats.org/officeDocument/2006/relationships" xmlns:p="http://schemas.openxmlformats.org/presentationml/2006/main">
   <p:cSld>
     <p:spTree>
@@ -11710,136 +12077,7 @@
 </p:sld>
 </file>
 
-<file path=ppt/slides/slide3.xml><?xml version="1.0" encoding="utf-8"?>
-<p:sld xmlns:a="http://schemas.openxmlformats.org/drawingml/2006/main" xmlns:r="http://schemas.openxmlformats.org/officeDocument/2006/relationships" xmlns:p="http://schemas.openxmlformats.org/presentationml/2006/main">
-  <p:cSld>
-    <p:spTree>
-      <p:nvGrpSpPr>
-        <p:cNvPr id="1" name=""/>
-        <p:cNvGrpSpPr/>
-        <p:nvPr/>
-      </p:nvGrpSpPr>
-      <p:grpSpPr>
-        <a:xfrm>
-          <a:off x="0" y="0"/>
-          <a:ext cx="0" cy="0"/>
-          <a:chOff x="0" y="0"/>
-          <a:chExt cx="0" cy="0"/>
-        </a:xfrm>
-      </p:grpSpPr>
-      <p:sp>
-        <p:nvSpPr>
-          <p:cNvPr id="2" name="Title 1"/>
-          <p:cNvSpPr>
-            <a:spLocks noGrp="1"/>
-          </p:cNvSpPr>
-          <p:nvPr>
-            <p:ph type="title"/>
-          </p:nvPr>
-        </p:nvSpPr>
-        <p:spPr/>
-        <p:txBody>
-          <a:bodyPr/>
-          <a:lstStyle/>
-          <a:p>
-            <a:r>
-              <a:rPr lang="en-US" dirty="0"/>
-              <a:t>Review</a:t>
-            </a:r>
-          </a:p>
-        </p:txBody>
-      </p:sp>
-      <p:sp>
-        <p:nvSpPr>
-          <p:cNvPr id="3" name="Content Placeholder 2"/>
-          <p:cNvSpPr>
-            <a:spLocks noGrp="1"/>
-          </p:cNvSpPr>
-          <p:nvPr>
-            <p:ph idx="1"/>
-          </p:nvPr>
-        </p:nvSpPr>
-        <p:spPr/>
-        <p:txBody>
-          <a:bodyPr>
-            <a:normAutofit fontScale="92500" lnSpcReduction="10000"/>
-          </a:bodyPr>
-          <a:lstStyle/>
-          <a:p>
-            <a:pPr marL="0" indent="0">
-              <a:buNone/>
-            </a:pPr>
-            <a:r>
-              <a:rPr lang="en-US" b="1" dirty="0"/>
-              <a:t>Previously in 3110:</a:t>
-            </a:r>
-          </a:p>
-          <a:p>
-            <a:r>
-              <a:rPr lang="en-US" dirty="0"/>
-              <a:t>Modules</a:t>
-            </a:r>
-          </a:p>
-          <a:p>
-            <a:r>
-              <a:rPr lang="en-US" dirty="0"/>
-              <a:t>Specification (functions, modules)</a:t>
-            </a:r>
-          </a:p>
-          <a:p>
-            <a:endParaRPr lang="en-US" dirty="0"/>
-          </a:p>
-          <a:p>
-            <a:pPr marL="0" indent="0">
-              <a:buNone/>
-            </a:pPr>
-            <a:r>
-              <a:rPr lang="en-US" b="1" dirty="0"/>
-              <a:t>Today:</a:t>
-            </a:r>
-          </a:p>
-          <a:p>
-            <a:r>
-              <a:rPr lang="en-US" dirty="0"/>
-              <a:t>Validation</a:t>
-            </a:r>
-          </a:p>
-          <a:p>
-            <a:r>
-              <a:rPr lang="en-US" dirty="0"/>
-              <a:t>Testing </a:t>
-            </a:r>
-          </a:p>
-          <a:p>
-            <a:pPr lvl="1"/>
-            <a:r>
-              <a:rPr lang="en-US" dirty="0"/>
-              <a:t>Black box</a:t>
-            </a:r>
-          </a:p>
-          <a:p>
-            <a:pPr lvl="1"/>
-            <a:r>
-              <a:rPr lang="en-US" dirty="0"/>
-              <a:t>Glass box</a:t>
-            </a:r>
-          </a:p>
-        </p:txBody>
-      </p:sp>
-    </p:spTree>
-    <p:extLst>
-      <p:ext uri="{BB962C8B-B14F-4D97-AF65-F5344CB8AC3E}">
-        <p14:creationId xmlns:p14="http://schemas.microsoft.com/office/powerpoint/2010/main" val="1939838692"/>
-      </p:ext>
-    </p:extLst>
-  </p:cSld>
-  <p:clrMapOvr>
-    <a:masterClrMapping/>
-  </p:clrMapOvr>
-</p:sld>
-</file>
-
-<file path=ppt/slides/slide30.xml><?xml version="1.0" encoding="utf-8"?>
+<file path=ppt/slides/slide32.xml><?xml version="1.0" encoding="utf-8"?>
 <p:sld xmlns:a="http://schemas.openxmlformats.org/drawingml/2006/main" xmlns:r="http://schemas.openxmlformats.org/officeDocument/2006/relationships" xmlns:p="http://schemas.openxmlformats.org/presentationml/2006/main">
   <p:cSld>
     <p:spTree>
@@ -12129,7 +12367,7 @@
 </p:sld>
 </file>
 
-<file path=ppt/slides/slide31.xml><?xml version="1.0" encoding="utf-8"?>
+<file path=ppt/slides/slide33.xml><?xml version="1.0" encoding="utf-8"?>
 <p:sld xmlns:a="http://schemas.openxmlformats.org/drawingml/2006/main" xmlns:r="http://schemas.openxmlformats.org/officeDocument/2006/relationships" xmlns:p="http://schemas.openxmlformats.org/presentationml/2006/main">
   <p:cSld>
     <p:spTree>
@@ -12231,7 +12469,618 @@
 </p:sld>
 </file>
 
-<file path=ppt/slides/slide32.xml><?xml version="1.0" encoding="utf-8"?>
+<file path=ppt/slides/slide34.xml><?xml version="1.0" encoding="utf-8"?>
+<p:sld xmlns:a="http://schemas.openxmlformats.org/drawingml/2006/main" xmlns:r="http://schemas.openxmlformats.org/officeDocument/2006/relationships" xmlns:p="http://schemas.openxmlformats.org/presentationml/2006/main">
+  <p:cSld>
+    <p:spTree>
+      <p:nvGrpSpPr>
+        <p:cNvPr id="1" name=""/>
+        <p:cNvGrpSpPr/>
+        <p:nvPr/>
+      </p:nvGrpSpPr>
+      <p:grpSpPr>
+        <a:xfrm>
+          <a:off x="0" y="0"/>
+          <a:ext cx="0" cy="0"/>
+          <a:chOff x="0" y="0"/>
+          <a:chExt cx="0" cy="0"/>
+        </a:xfrm>
+      </p:grpSpPr>
+      <p:sp>
+        <p:nvSpPr>
+          <p:cNvPr id="4" name="Title 3"/>
+          <p:cNvSpPr>
+            <a:spLocks noGrp="1"/>
+          </p:cNvSpPr>
+          <p:nvPr>
+            <p:ph type="title"/>
+          </p:nvPr>
+        </p:nvSpPr>
+        <p:spPr/>
+        <p:txBody>
+          <a:bodyPr/>
+          <a:lstStyle/>
+          <a:p>
+            <a:r>
+              <a:rPr lang="en-US" dirty="0"/>
+              <a:t>Randomized (“Fuzz”) Testing</a:t>
+            </a:r>
+          </a:p>
+        </p:txBody>
+      </p:sp>
+      <p:sp>
+        <p:nvSpPr>
+          <p:cNvPr id="5" name="Text Placeholder 4"/>
+          <p:cNvSpPr>
+            <a:spLocks noGrp="1"/>
+          </p:cNvSpPr>
+          <p:nvPr>
+            <p:ph type="body" idx="1"/>
+          </p:nvPr>
+        </p:nvSpPr>
+        <p:spPr/>
+        <p:txBody>
+          <a:bodyPr/>
+          <a:lstStyle/>
+          <a:p>
+            <a:endParaRPr lang="en-US"/>
+          </a:p>
+        </p:txBody>
+      </p:sp>
+    </p:spTree>
+    <p:extLst>
+      <p:ext uri="{BB962C8B-B14F-4D97-AF65-F5344CB8AC3E}">
+        <p14:creationId xmlns:p14="http://schemas.microsoft.com/office/powerpoint/2010/main" val="4182412327"/>
+      </p:ext>
+    </p:extLst>
+  </p:cSld>
+  <p:clrMapOvr>
+    <a:masterClrMapping/>
+  </p:clrMapOvr>
+</p:sld>
+</file>
+
+<file path=ppt/slides/slide35.xml><?xml version="1.0" encoding="utf-8"?>
+<p:sld xmlns:a="http://schemas.openxmlformats.org/drawingml/2006/main" xmlns:r="http://schemas.openxmlformats.org/officeDocument/2006/relationships" xmlns:p="http://schemas.openxmlformats.org/presentationml/2006/main">
+  <p:cSld>
+    <p:spTree>
+      <p:nvGrpSpPr>
+        <p:cNvPr id="1" name=""/>
+        <p:cNvGrpSpPr/>
+        <p:nvPr/>
+      </p:nvGrpSpPr>
+      <p:grpSpPr>
+        <a:xfrm>
+          <a:off x="0" y="0"/>
+          <a:ext cx="0" cy="0"/>
+          <a:chOff x="0" y="0"/>
+          <a:chExt cx="0" cy="0"/>
+        </a:xfrm>
+      </p:grpSpPr>
+      <p:sp>
+        <p:nvSpPr>
+          <p:cNvPr id="2" name="Title 1"/>
+          <p:cNvSpPr>
+            <a:spLocks noGrp="1"/>
+          </p:cNvSpPr>
+          <p:nvPr>
+            <p:ph type="title"/>
+          </p:nvPr>
+        </p:nvSpPr>
+        <p:spPr/>
+        <p:txBody>
+          <a:bodyPr/>
+          <a:lstStyle/>
+          <a:p>
+            <a:r>
+              <a:rPr lang="en-US" dirty="0"/>
+              <a:t>Randomized testing</a:t>
+            </a:r>
+          </a:p>
+        </p:txBody>
+      </p:sp>
+      <p:sp>
+        <p:nvSpPr>
+          <p:cNvPr id="3" name="Content Placeholder 2"/>
+          <p:cNvSpPr>
+            <a:spLocks noGrp="1"/>
+          </p:cNvSpPr>
+          <p:nvPr>
+            <p:ph idx="1"/>
+          </p:nvPr>
+        </p:nvSpPr>
+        <p:spPr/>
+        <p:txBody>
+          <a:bodyPr>
+            <a:normAutofit fontScale="85000" lnSpcReduction="10000"/>
+          </a:bodyPr>
+          <a:lstStyle/>
+          <a:p>
+            <a:r>
+              <a:rPr lang="en-US" i="1" dirty="0">
+                <a:solidFill>
+                  <a:schemeClr val="accent3"/>
+                </a:solidFill>
+              </a:rPr>
+              <a:t>"It was a dark and stormy night..."</a:t>
+            </a:r>
+          </a:p>
+          <a:p>
+            <a:r>
+              <a:rPr lang="en-US" dirty="0"/>
+              <a:t>Generate </a:t>
+            </a:r>
+            <a:r>
+              <a:rPr lang="en-US" dirty="0">
+                <a:solidFill>
+                  <a:srgbClr val="4F81BD"/>
+                </a:solidFill>
+              </a:rPr>
+              <a:t>random inputs </a:t>
+            </a:r>
+            <a:r>
+              <a:rPr lang="en-US" dirty="0"/>
+              <a:t>and feed them to programs:</a:t>
+            </a:r>
+          </a:p>
+          <a:p>
+            <a:pPr lvl="1"/>
+            <a:r>
+              <a:rPr lang="en-US" dirty="0"/>
+              <a:t>Crash? hang? terminate normally?</a:t>
+            </a:r>
+          </a:p>
+          <a:p>
+            <a:pPr lvl="1"/>
+            <a:r>
+              <a:rPr lang="en-US" dirty="0"/>
+              <a:t>Of ~90 utilities in '89, crashed about 25-33% in various </a:t>
+            </a:r>
+            <a:r>
+              <a:rPr lang="en-US" dirty="0" err="1"/>
+              <a:t>Unixes</a:t>
+            </a:r>
+            <a:endParaRPr lang="en-US" dirty="0"/>
+          </a:p>
+          <a:p>
+            <a:pPr lvl="1"/>
+            <a:r>
+              <a:rPr lang="en-US" dirty="0"/>
+              <a:t>Crash =&gt; buffer overflow potential</a:t>
+            </a:r>
+          </a:p>
+          <a:p>
+            <a:r>
+              <a:rPr lang="en-US" dirty="0"/>
+              <a:t>Since then, "fuzzing" has become a standard practice for security testing</a:t>
+            </a:r>
+          </a:p>
+          <a:p>
+            <a:r>
+              <a:rPr lang="en-US" dirty="0"/>
+              <a:t>Results have been repeated for X-windows system, Windows NT, Mac OS X</a:t>
+            </a:r>
+          </a:p>
+          <a:p>
+            <a:pPr lvl="1"/>
+            <a:r>
+              <a:rPr lang="en-US" dirty="0">
+                <a:solidFill>
+                  <a:schemeClr val="accent1"/>
+                </a:solidFill>
+              </a:rPr>
+              <a:t>Results keep getting </a:t>
+            </a:r>
+            <a:r>
+              <a:rPr lang="en-US" b="1" dirty="0">
+                <a:solidFill>
+                  <a:schemeClr val="accent1"/>
+                </a:solidFill>
+              </a:rPr>
+              <a:t>worse</a:t>
+            </a:r>
+            <a:r>
+              <a:rPr lang="en-US" dirty="0">
+                <a:solidFill>
+                  <a:schemeClr val="accent1"/>
+                </a:solidFill>
+              </a:rPr>
+              <a:t> in GUIs</a:t>
+            </a:r>
+            <a:r>
+              <a:rPr lang="en-US" dirty="0"/>
+              <a:t> but better on command line</a:t>
+            </a:r>
+          </a:p>
+        </p:txBody>
+      </p:sp>
+    </p:spTree>
+    <p:extLst>
+      <p:ext uri="{BB962C8B-B14F-4D97-AF65-F5344CB8AC3E}">
+        <p14:creationId xmlns:p14="http://schemas.microsoft.com/office/powerpoint/2010/main" val="758702113"/>
+      </p:ext>
+    </p:extLst>
+  </p:cSld>
+  <p:clrMapOvr>
+    <a:masterClrMapping/>
+  </p:clrMapOvr>
+  <p:timing>
+    <p:tnLst>
+      <p:par>
+        <p:cTn id="1" dur="indefinite" restart="never" nodeType="tmRoot">
+          <p:childTnLst>
+            <p:seq concurrent="1" nextAc="seek">
+              <p:cTn id="2" dur="indefinite" nodeType="mainSeq">
+                <p:childTnLst>
+                  <p:par>
+                    <p:cTn id="3" fill="hold">
+                      <p:stCondLst>
+                        <p:cond delay="indefinite"/>
+                      </p:stCondLst>
+                      <p:childTnLst>
+                        <p:par>
+                          <p:cTn id="4" fill="hold">
+                            <p:stCondLst>
+                              <p:cond delay="0"/>
+                            </p:stCondLst>
+                            <p:childTnLst>
+                              <p:par>
+                                <p:cTn id="5" presetID="1" presetClass="entr" presetSubtype="0" fill="hold" nodeType="clickEffect">
+                                  <p:stCondLst>
+                                    <p:cond delay="0"/>
+                                  </p:stCondLst>
+                                  <p:childTnLst>
+                                    <p:set>
+                                      <p:cBhvr>
+                                        <p:cTn id="6" dur="1" fill="hold">
+                                          <p:stCondLst>
+                                            <p:cond delay="0"/>
+                                          </p:stCondLst>
+                                        </p:cTn>
+                                        <p:tgtEl>
+                                          <p:spTgt spid="3">
+                                            <p:txEl>
+                                              <p:pRg st="1" end="1"/>
+                                            </p:txEl>
+                                          </p:spTgt>
+                                        </p:tgtEl>
+                                        <p:attrNameLst>
+                                          <p:attrName>style.visibility</p:attrName>
+                                        </p:attrNameLst>
+                                      </p:cBhvr>
+                                      <p:to>
+                                        <p:strVal val="visible"/>
+                                      </p:to>
+                                    </p:set>
+                                  </p:childTnLst>
+                                </p:cTn>
+                              </p:par>
+                            </p:childTnLst>
+                          </p:cTn>
+                        </p:par>
+                      </p:childTnLst>
+                    </p:cTn>
+                  </p:par>
+                  <p:par>
+                    <p:cTn id="7" fill="hold">
+                      <p:stCondLst>
+                        <p:cond delay="indefinite"/>
+                      </p:stCondLst>
+                      <p:childTnLst>
+                        <p:par>
+                          <p:cTn id="8" fill="hold">
+                            <p:stCondLst>
+                              <p:cond delay="0"/>
+                            </p:stCondLst>
+                            <p:childTnLst>
+                              <p:par>
+                                <p:cTn id="9" presetID="1" presetClass="entr" presetSubtype="0" fill="hold" nodeType="clickEffect">
+                                  <p:stCondLst>
+                                    <p:cond delay="0"/>
+                                  </p:stCondLst>
+                                  <p:childTnLst>
+                                    <p:set>
+                                      <p:cBhvr>
+                                        <p:cTn id="10" dur="1" fill="hold">
+                                          <p:stCondLst>
+                                            <p:cond delay="0"/>
+                                          </p:stCondLst>
+                                        </p:cTn>
+                                        <p:tgtEl>
+                                          <p:spTgt spid="3">
+                                            <p:txEl>
+                                              <p:pRg st="2" end="2"/>
+                                            </p:txEl>
+                                          </p:spTgt>
+                                        </p:tgtEl>
+                                        <p:attrNameLst>
+                                          <p:attrName>style.visibility</p:attrName>
+                                        </p:attrNameLst>
+                                      </p:cBhvr>
+                                      <p:to>
+                                        <p:strVal val="visible"/>
+                                      </p:to>
+                                    </p:set>
+                                  </p:childTnLst>
+                                </p:cTn>
+                              </p:par>
+                            </p:childTnLst>
+                          </p:cTn>
+                        </p:par>
+                      </p:childTnLst>
+                    </p:cTn>
+                  </p:par>
+                  <p:par>
+                    <p:cTn id="11" fill="hold">
+                      <p:stCondLst>
+                        <p:cond delay="indefinite"/>
+                      </p:stCondLst>
+                      <p:childTnLst>
+                        <p:par>
+                          <p:cTn id="12" fill="hold">
+                            <p:stCondLst>
+                              <p:cond delay="0"/>
+                            </p:stCondLst>
+                            <p:childTnLst>
+                              <p:par>
+                                <p:cTn id="13" presetID="1" presetClass="entr" presetSubtype="0" fill="hold" nodeType="clickEffect">
+                                  <p:stCondLst>
+                                    <p:cond delay="0"/>
+                                  </p:stCondLst>
+                                  <p:childTnLst>
+                                    <p:set>
+                                      <p:cBhvr>
+                                        <p:cTn id="14" dur="1" fill="hold">
+                                          <p:stCondLst>
+                                            <p:cond delay="0"/>
+                                          </p:stCondLst>
+                                        </p:cTn>
+                                        <p:tgtEl>
+                                          <p:spTgt spid="3">
+                                            <p:txEl>
+                                              <p:pRg st="3" end="3"/>
+                                            </p:txEl>
+                                          </p:spTgt>
+                                        </p:tgtEl>
+                                        <p:attrNameLst>
+                                          <p:attrName>style.visibility</p:attrName>
+                                        </p:attrNameLst>
+                                      </p:cBhvr>
+                                      <p:to>
+                                        <p:strVal val="visible"/>
+                                      </p:to>
+                                    </p:set>
+                                  </p:childTnLst>
+                                </p:cTn>
+                              </p:par>
+                            </p:childTnLst>
+                          </p:cTn>
+                        </p:par>
+                      </p:childTnLst>
+                    </p:cTn>
+                  </p:par>
+                  <p:par>
+                    <p:cTn id="15" fill="hold">
+                      <p:stCondLst>
+                        <p:cond delay="indefinite"/>
+                      </p:stCondLst>
+                      <p:childTnLst>
+                        <p:par>
+                          <p:cTn id="16" fill="hold">
+                            <p:stCondLst>
+                              <p:cond delay="0"/>
+                            </p:stCondLst>
+                            <p:childTnLst>
+                              <p:par>
+                                <p:cTn id="17" presetID="1" presetClass="entr" presetSubtype="0" fill="hold" nodeType="clickEffect">
+                                  <p:stCondLst>
+                                    <p:cond delay="0"/>
+                                  </p:stCondLst>
+                                  <p:childTnLst>
+                                    <p:set>
+                                      <p:cBhvr>
+                                        <p:cTn id="18" dur="1" fill="hold">
+                                          <p:stCondLst>
+                                            <p:cond delay="0"/>
+                                          </p:stCondLst>
+                                        </p:cTn>
+                                        <p:tgtEl>
+                                          <p:spTgt spid="3">
+                                            <p:txEl>
+                                              <p:pRg st="4" end="4"/>
+                                            </p:txEl>
+                                          </p:spTgt>
+                                        </p:tgtEl>
+                                        <p:attrNameLst>
+                                          <p:attrName>style.visibility</p:attrName>
+                                        </p:attrNameLst>
+                                      </p:cBhvr>
+                                      <p:to>
+                                        <p:strVal val="visible"/>
+                                      </p:to>
+                                    </p:set>
+                                  </p:childTnLst>
+                                </p:cTn>
+                              </p:par>
+                            </p:childTnLst>
+                          </p:cTn>
+                        </p:par>
+                      </p:childTnLst>
+                    </p:cTn>
+                  </p:par>
+                  <p:par>
+                    <p:cTn id="19" fill="hold">
+                      <p:stCondLst>
+                        <p:cond delay="indefinite"/>
+                      </p:stCondLst>
+                      <p:childTnLst>
+                        <p:par>
+                          <p:cTn id="20" fill="hold">
+                            <p:stCondLst>
+                              <p:cond delay="0"/>
+                            </p:stCondLst>
+                            <p:childTnLst>
+                              <p:par>
+                                <p:cTn id="21" presetID="1" presetClass="entr" presetSubtype="0" fill="hold" nodeType="clickEffect">
+                                  <p:stCondLst>
+                                    <p:cond delay="0"/>
+                                  </p:stCondLst>
+                                  <p:childTnLst>
+                                    <p:set>
+                                      <p:cBhvr>
+                                        <p:cTn id="22" dur="1" fill="hold">
+                                          <p:stCondLst>
+                                            <p:cond delay="0"/>
+                                          </p:stCondLst>
+                                        </p:cTn>
+                                        <p:tgtEl>
+                                          <p:spTgt spid="3">
+                                            <p:txEl>
+                                              <p:pRg st="5" end="5"/>
+                                            </p:txEl>
+                                          </p:spTgt>
+                                        </p:tgtEl>
+                                        <p:attrNameLst>
+                                          <p:attrName>style.visibility</p:attrName>
+                                        </p:attrNameLst>
+                                      </p:cBhvr>
+                                      <p:to>
+                                        <p:strVal val="visible"/>
+                                      </p:to>
+                                    </p:set>
+                                  </p:childTnLst>
+                                </p:cTn>
+                              </p:par>
+                            </p:childTnLst>
+                          </p:cTn>
+                        </p:par>
+                      </p:childTnLst>
+                    </p:cTn>
+                  </p:par>
+                  <p:par>
+                    <p:cTn id="23" fill="hold">
+                      <p:stCondLst>
+                        <p:cond delay="indefinite"/>
+                      </p:stCondLst>
+                      <p:childTnLst>
+                        <p:par>
+                          <p:cTn id="24" fill="hold">
+                            <p:stCondLst>
+                              <p:cond delay="0"/>
+                            </p:stCondLst>
+                            <p:childTnLst>
+                              <p:par>
+                                <p:cTn id="25" presetID="1" presetClass="entr" presetSubtype="0" fill="hold" nodeType="clickEffect">
+                                  <p:stCondLst>
+                                    <p:cond delay="0"/>
+                                  </p:stCondLst>
+                                  <p:childTnLst>
+                                    <p:set>
+                                      <p:cBhvr>
+                                        <p:cTn id="26" dur="1" fill="hold">
+                                          <p:stCondLst>
+                                            <p:cond delay="0"/>
+                                          </p:stCondLst>
+                                        </p:cTn>
+                                        <p:tgtEl>
+                                          <p:spTgt spid="3">
+                                            <p:txEl>
+                                              <p:pRg st="6" end="6"/>
+                                            </p:txEl>
+                                          </p:spTgt>
+                                        </p:tgtEl>
+                                        <p:attrNameLst>
+                                          <p:attrName>style.visibility</p:attrName>
+                                        </p:attrNameLst>
+                                      </p:cBhvr>
+                                      <p:to>
+                                        <p:strVal val="visible"/>
+                                      </p:to>
+                                    </p:set>
+                                  </p:childTnLst>
+                                </p:cTn>
+                              </p:par>
+                            </p:childTnLst>
+                          </p:cTn>
+                        </p:par>
+                      </p:childTnLst>
+                    </p:cTn>
+                  </p:par>
+                  <p:par>
+                    <p:cTn id="27" fill="hold">
+                      <p:stCondLst>
+                        <p:cond delay="indefinite"/>
+                      </p:stCondLst>
+                      <p:childTnLst>
+                        <p:par>
+                          <p:cTn id="28" fill="hold">
+                            <p:stCondLst>
+                              <p:cond delay="0"/>
+                            </p:stCondLst>
+                            <p:childTnLst>
+                              <p:par>
+                                <p:cTn id="29" presetID="1" presetClass="entr" presetSubtype="0" fill="hold" nodeType="clickEffect">
+                                  <p:stCondLst>
+                                    <p:cond delay="0"/>
+                                  </p:stCondLst>
+                                  <p:childTnLst>
+                                    <p:set>
+                                      <p:cBhvr>
+                                        <p:cTn id="30" dur="1" fill="hold">
+                                          <p:stCondLst>
+                                            <p:cond delay="0"/>
+                                          </p:stCondLst>
+                                        </p:cTn>
+                                        <p:tgtEl>
+                                          <p:spTgt spid="3">
+                                            <p:txEl>
+                                              <p:pRg st="7" end="7"/>
+                                            </p:txEl>
+                                          </p:spTgt>
+                                        </p:tgtEl>
+                                        <p:attrNameLst>
+                                          <p:attrName>style.visibility</p:attrName>
+                                        </p:attrNameLst>
+                                      </p:cBhvr>
+                                      <p:to>
+                                        <p:strVal val="visible"/>
+                                      </p:to>
+                                    </p:set>
+                                  </p:childTnLst>
+                                </p:cTn>
+                              </p:par>
+                            </p:childTnLst>
+                          </p:cTn>
+                        </p:par>
+                      </p:childTnLst>
+                    </p:cTn>
+                  </p:par>
+                </p:childTnLst>
+              </p:cTn>
+              <p:prevCondLst>
+                <p:cond evt="onPrev" delay="0">
+                  <p:tgtEl>
+                    <p:sldTgt/>
+                  </p:tgtEl>
+                </p:cond>
+              </p:prevCondLst>
+              <p:nextCondLst>
+                <p:cond evt="onNext" delay="0">
+                  <p:tgtEl>
+                    <p:sldTgt/>
+                  </p:tgtEl>
+                </p:cond>
+              </p:nextCondLst>
+            </p:seq>
+          </p:childTnLst>
+        </p:cTn>
+      </p:par>
+    </p:tnLst>
+  </p:timing>
+</p:sld>
+</file>
+
+<file path=ppt/slides/slide36.xml><?xml version="1.0" encoding="utf-8"?>
 <p:sld xmlns:a="http://schemas.openxmlformats.org/drawingml/2006/main" xmlns:r="http://schemas.openxmlformats.org/officeDocument/2006/relationships" xmlns:p="http://schemas.openxmlformats.org/presentationml/2006/main">
   <p:cSld>
     <p:spTree>

</xml_diff>